<commit_message>
Files added to project folder
</commit_message>
<xml_diff>
--- a/Planning/Figures.pptx
+++ b/Planning/Figures.pptx
@@ -264,7 +264,7 @@
           <a:p>
             <a:fld id="{C2A86601-DD56-4A18-B3D0-977544BEB497}" type="datetimeFigureOut">
               <a:rPr lang="en-AU" smtClean="0"/>
-              <a:t>21/05/2020</a:t>
+              <a:t>26/05/2020</a:t>
             </a:fld>
             <a:endParaRPr lang="en-AU"/>
           </a:p>
@@ -464,7 +464,7 @@
           <a:p>
             <a:fld id="{C2A86601-DD56-4A18-B3D0-977544BEB497}" type="datetimeFigureOut">
               <a:rPr lang="en-AU" smtClean="0"/>
-              <a:t>21/05/2020</a:t>
+              <a:t>26/05/2020</a:t>
             </a:fld>
             <a:endParaRPr lang="en-AU"/>
           </a:p>
@@ -674,7 +674,7 @@
           <a:p>
             <a:fld id="{C2A86601-DD56-4A18-B3D0-977544BEB497}" type="datetimeFigureOut">
               <a:rPr lang="en-AU" smtClean="0"/>
-              <a:t>21/05/2020</a:t>
+              <a:t>26/05/2020</a:t>
             </a:fld>
             <a:endParaRPr lang="en-AU"/>
           </a:p>
@@ -874,7 +874,7 @@
           <a:p>
             <a:fld id="{C2A86601-DD56-4A18-B3D0-977544BEB497}" type="datetimeFigureOut">
               <a:rPr lang="en-AU" smtClean="0"/>
-              <a:t>21/05/2020</a:t>
+              <a:t>26/05/2020</a:t>
             </a:fld>
             <a:endParaRPr lang="en-AU"/>
           </a:p>
@@ -1150,7 +1150,7 @@
           <a:p>
             <a:fld id="{C2A86601-DD56-4A18-B3D0-977544BEB497}" type="datetimeFigureOut">
               <a:rPr lang="en-AU" smtClean="0"/>
-              <a:t>21/05/2020</a:t>
+              <a:t>26/05/2020</a:t>
             </a:fld>
             <a:endParaRPr lang="en-AU"/>
           </a:p>
@@ -1418,7 +1418,7 @@
           <a:p>
             <a:fld id="{C2A86601-DD56-4A18-B3D0-977544BEB497}" type="datetimeFigureOut">
               <a:rPr lang="en-AU" smtClean="0"/>
-              <a:t>21/05/2020</a:t>
+              <a:t>26/05/2020</a:t>
             </a:fld>
             <a:endParaRPr lang="en-AU"/>
           </a:p>
@@ -1833,7 +1833,7 @@
           <a:p>
             <a:fld id="{C2A86601-DD56-4A18-B3D0-977544BEB497}" type="datetimeFigureOut">
               <a:rPr lang="en-AU" smtClean="0"/>
-              <a:t>21/05/2020</a:t>
+              <a:t>26/05/2020</a:t>
             </a:fld>
             <a:endParaRPr lang="en-AU"/>
           </a:p>
@@ -1975,7 +1975,7 @@
           <a:p>
             <a:fld id="{C2A86601-DD56-4A18-B3D0-977544BEB497}" type="datetimeFigureOut">
               <a:rPr lang="en-AU" smtClean="0"/>
-              <a:t>21/05/2020</a:t>
+              <a:t>26/05/2020</a:t>
             </a:fld>
             <a:endParaRPr lang="en-AU"/>
           </a:p>
@@ -2088,7 +2088,7 @@
           <a:p>
             <a:fld id="{C2A86601-DD56-4A18-B3D0-977544BEB497}" type="datetimeFigureOut">
               <a:rPr lang="en-AU" smtClean="0"/>
-              <a:t>21/05/2020</a:t>
+              <a:t>26/05/2020</a:t>
             </a:fld>
             <a:endParaRPr lang="en-AU"/>
           </a:p>
@@ -2401,7 +2401,7 @@
           <a:p>
             <a:fld id="{C2A86601-DD56-4A18-B3D0-977544BEB497}" type="datetimeFigureOut">
               <a:rPr lang="en-AU" smtClean="0"/>
-              <a:t>21/05/2020</a:t>
+              <a:t>26/05/2020</a:t>
             </a:fld>
             <a:endParaRPr lang="en-AU"/>
           </a:p>
@@ -2690,7 +2690,7 @@
           <a:p>
             <a:fld id="{C2A86601-DD56-4A18-B3D0-977544BEB497}" type="datetimeFigureOut">
               <a:rPr lang="en-AU" smtClean="0"/>
-              <a:t>21/05/2020</a:t>
+              <a:t>26/05/2020</a:t>
             </a:fld>
             <a:endParaRPr lang="en-AU"/>
           </a:p>
@@ -2933,7 +2933,7 @@
           <a:p>
             <a:fld id="{C2A86601-DD56-4A18-B3D0-977544BEB497}" type="datetimeFigureOut">
               <a:rPr lang="en-AU" smtClean="0"/>
-              <a:t>21/05/2020</a:t>
+              <a:t>26/05/2020</a:t>
             </a:fld>
             <a:endParaRPr lang="en-AU"/>
           </a:p>
@@ -3864,57 +3864,6 @@
             </a:fontRef>
           </p:style>
         </p:cxnSp>
-        <p:sp>
-          <p:nvSpPr>
-            <p:cNvPr id="41" name="Rectangle 40">
-              <a:extLst>
-                <a:ext uri="{FF2B5EF4-FFF2-40B4-BE49-F238E27FC236}">
-                  <a16:creationId xmlns:a16="http://schemas.microsoft.com/office/drawing/2014/main" id="{23ED6191-B783-49BD-B1A6-4A205BC82537}"/>
-                </a:ext>
-              </a:extLst>
-            </p:cNvPr>
-            <p:cNvSpPr/>
-            <p:nvPr/>
-          </p:nvSpPr>
-          <p:spPr>
-            <a:xfrm>
-              <a:off x="262211" y="2244438"/>
-              <a:ext cx="1181285" cy="3749962"/>
-            </a:xfrm>
-            <a:prstGeom prst="rect">
-              <a:avLst/>
-            </a:prstGeom>
-            <a:solidFill>
-              <a:schemeClr val="accent1">
-                <a:alpha val="56000"/>
-              </a:schemeClr>
-            </a:solidFill>
-          </p:spPr>
-          <p:style>
-            <a:lnRef idx="2">
-              <a:schemeClr val="accent1">
-                <a:shade val="50000"/>
-              </a:schemeClr>
-            </a:lnRef>
-            <a:fillRef idx="1">
-              <a:schemeClr val="accent1"/>
-            </a:fillRef>
-            <a:effectRef idx="0">
-              <a:schemeClr val="accent1"/>
-            </a:effectRef>
-            <a:fontRef idx="minor">
-              <a:schemeClr val="lt1"/>
-            </a:fontRef>
-          </p:style>
-          <p:txBody>
-            <a:bodyPr rtlCol="0" anchor="ctr"/>
-            <a:lstStyle/>
-            <a:p>
-              <a:pPr algn="ctr"/>
-              <a:endParaRPr lang="en-AU"/>
-            </a:p>
-          </p:txBody>
-        </p:sp>
         <p:grpSp>
           <p:nvGrpSpPr>
             <p:cNvPr id="51" name="Group 50">
@@ -4499,11 +4448,30 @@
           <a:prstGeom prst="rect">
             <a:avLst/>
           </a:prstGeom>
-          <a:solidFill>
-            <a:schemeClr val="accent1">
-              <a:alpha val="48000"/>
-            </a:schemeClr>
-          </a:solidFill>
+          <a:gradFill flip="none" rotWithShape="1">
+            <a:gsLst>
+              <a:gs pos="0">
+                <a:schemeClr val="accent1">
+                  <a:shade val="30000"/>
+                  <a:satMod val="115000"/>
+                </a:schemeClr>
+              </a:gs>
+              <a:gs pos="50000">
+                <a:schemeClr val="accent1">
+                  <a:shade val="67500"/>
+                  <a:satMod val="115000"/>
+                </a:schemeClr>
+              </a:gs>
+              <a:gs pos="100000">
+                <a:schemeClr val="accent1">
+                  <a:shade val="100000"/>
+                  <a:satMod val="115000"/>
+                </a:schemeClr>
+              </a:gs>
+            </a:gsLst>
+            <a:lin ang="2700000" scaled="1"/>
+            <a:tileRect/>
+          </a:gradFill>
           <a:ln w="38100">
             <a:solidFill>
               <a:schemeClr val="tx1"/>
@@ -5008,6 +4976,11 @@
           <a:prstGeom prst="ellipse">
             <a:avLst/>
           </a:prstGeom>
+          <a:solidFill>
+            <a:schemeClr val="accent1">
+              <a:lumMod val="75000"/>
+            </a:schemeClr>
+          </a:solidFill>
           <a:ln>
             <a:solidFill>
               <a:schemeClr val="dk1">
@@ -5062,6 +5035,11 @@
           <a:prstGeom prst="triangle">
             <a:avLst/>
           </a:prstGeom>
+          <a:solidFill>
+            <a:schemeClr val="accent1">
+              <a:lumMod val="75000"/>
+            </a:schemeClr>
+          </a:solidFill>
           <a:ln>
             <a:solidFill>
               <a:schemeClr val="dk1">
@@ -5345,7 +5323,7 @@
         <p:spPr>
           <a:xfrm>
             <a:off x="3514473" y="2549057"/>
-            <a:ext cx="2004275" cy="307777"/>
+            <a:ext cx="2004275" cy="738664"/>
           </a:xfrm>
           <a:prstGeom prst="rect">
             <a:avLst/>
@@ -5360,7 +5338,7 @@
           <a:p>
             <a:r>
               <a:rPr lang="en-AU" sz="1400" dirty="0"/>
-              <a:t>White opaque acrylic</a:t>
+              <a:t>White opaque acrylic; good contrast, improves tracking</a:t>
             </a:r>
           </a:p>
         </p:txBody>
@@ -5382,8 +5360,8 @@
         </p:nvCxnSpPr>
         <p:spPr>
           <a:xfrm flipH="1">
-            <a:off x="2954099" y="2702946"/>
-            <a:ext cx="560374" cy="551051"/>
+            <a:off x="2954099" y="2918389"/>
+            <a:ext cx="560374" cy="335608"/>
           </a:xfrm>
           <a:prstGeom prst="straightConnector1">
             <a:avLst/>
@@ -5401,6 +5379,86 @@
           </a:fillRef>
           <a:effectRef idx="0">
             <a:schemeClr val="accent1"/>
+          </a:effectRef>
+          <a:fontRef idx="minor">
+            <a:schemeClr val="tx1"/>
+          </a:fontRef>
+        </p:style>
+      </p:cxnSp>
+      <p:sp>
+        <p:nvSpPr>
+          <p:cNvPr id="57" name="TextBox 56">
+            <a:extLst>
+              <a:ext uri="{FF2B5EF4-FFF2-40B4-BE49-F238E27FC236}">
+                <a16:creationId xmlns:a16="http://schemas.microsoft.com/office/drawing/2014/main" id="{FB3FAB4D-ADA5-4B00-B3BE-4DE6F281BBD6}"/>
+              </a:ext>
+            </a:extLst>
+          </p:cNvPr>
+          <p:cNvSpPr txBox="1"/>
+          <p:nvPr/>
+        </p:nvSpPr>
+        <p:spPr>
+          <a:xfrm>
+            <a:off x="9721567" y="6166421"/>
+            <a:ext cx="2004275" cy="954107"/>
+          </a:xfrm>
+          <a:prstGeom prst="rect">
+            <a:avLst/>
+          </a:prstGeom>
+          <a:noFill/>
+        </p:spPr>
+        <p:txBody>
+          <a:bodyPr wrap="square" rtlCol="0">
+            <a:spAutoFit/>
+          </a:bodyPr>
+          <a:lstStyle/>
+          <a:p>
+            <a:r>
+              <a:rPr lang="en-AU" sz="1400" dirty="0"/>
+              <a:t>Blue tint on trapezoidal tanks; poor contrast, difficult to track fish</a:t>
+            </a:r>
+          </a:p>
+          <a:p>
+            <a:endParaRPr lang="en-AU" sz="1400" dirty="0"/>
+          </a:p>
+        </p:txBody>
+      </p:sp>
+      <p:cxnSp>
+        <p:nvCxnSpPr>
+          <p:cNvPr id="60" name="Straight Arrow Connector 59">
+            <a:extLst>
+              <a:ext uri="{FF2B5EF4-FFF2-40B4-BE49-F238E27FC236}">
+                <a16:creationId xmlns:a16="http://schemas.microsoft.com/office/drawing/2014/main" id="{C57B4B9A-F5D7-44F8-A187-1CA7056F8A5C}"/>
+              </a:ext>
+            </a:extLst>
+          </p:cNvPr>
+          <p:cNvCxnSpPr>
+            <a:cxnSpLocks/>
+            <a:stCxn id="57" idx="1"/>
+          </p:cNvCxnSpPr>
+          <p:nvPr/>
+        </p:nvCxnSpPr>
+        <p:spPr>
+          <a:xfrm flipH="1" flipV="1">
+            <a:off x="9336267" y="5327473"/>
+            <a:ext cx="385300" cy="1316002"/>
+          </a:xfrm>
+          <a:prstGeom prst="straightConnector1">
+            <a:avLst/>
+          </a:prstGeom>
+          <a:ln w="38100">
+            <a:tailEnd type="triangle"/>
+          </a:ln>
+        </p:spPr>
+        <p:style>
+          <a:lnRef idx="1">
+            <a:schemeClr val="dk1"/>
+          </a:lnRef>
+          <a:fillRef idx="0">
+            <a:schemeClr val="dk1"/>
+          </a:fillRef>
+          <a:effectRef idx="0">
+            <a:schemeClr val="dk1"/>
           </a:effectRef>
           <a:fontRef idx="minor">
             <a:schemeClr val="tx1"/>

</xml_diff>

<commit_message>
Sex analysis run with 10,000 bootstraps
</commit_message>
<xml_diff>
--- a/Planning/Figures.pptx
+++ b/Planning/Figures.pptx
@@ -264,7 +264,7 @@
           <a:p>
             <a:fld id="{C2A86601-DD56-4A18-B3D0-977544BEB497}" type="datetimeFigureOut">
               <a:rPr lang="en-AU" smtClean="0"/>
-              <a:t>26/05/2020</a:t>
+              <a:t>11/07/2020</a:t>
             </a:fld>
             <a:endParaRPr lang="en-AU"/>
           </a:p>
@@ -464,7 +464,7 @@
           <a:p>
             <a:fld id="{C2A86601-DD56-4A18-B3D0-977544BEB497}" type="datetimeFigureOut">
               <a:rPr lang="en-AU" smtClean="0"/>
-              <a:t>26/05/2020</a:t>
+              <a:t>11/07/2020</a:t>
             </a:fld>
             <a:endParaRPr lang="en-AU"/>
           </a:p>
@@ -674,7 +674,7 @@
           <a:p>
             <a:fld id="{C2A86601-DD56-4A18-B3D0-977544BEB497}" type="datetimeFigureOut">
               <a:rPr lang="en-AU" smtClean="0"/>
-              <a:t>26/05/2020</a:t>
+              <a:t>11/07/2020</a:t>
             </a:fld>
             <a:endParaRPr lang="en-AU"/>
           </a:p>
@@ -874,7 +874,7 @@
           <a:p>
             <a:fld id="{C2A86601-DD56-4A18-B3D0-977544BEB497}" type="datetimeFigureOut">
               <a:rPr lang="en-AU" smtClean="0"/>
-              <a:t>26/05/2020</a:t>
+              <a:t>11/07/2020</a:t>
             </a:fld>
             <a:endParaRPr lang="en-AU"/>
           </a:p>
@@ -1150,7 +1150,7 @@
           <a:p>
             <a:fld id="{C2A86601-DD56-4A18-B3D0-977544BEB497}" type="datetimeFigureOut">
               <a:rPr lang="en-AU" smtClean="0"/>
-              <a:t>26/05/2020</a:t>
+              <a:t>11/07/2020</a:t>
             </a:fld>
             <a:endParaRPr lang="en-AU"/>
           </a:p>
@@ -1418,7 +1418,7 @@
           <a:p>
             <a:fld id="{C2A86601-DD56-4A18-B3D0-977544BEB497}" type="datetimeFigureOut">
               <a:rPr lang="en-AU" smtClean="0"/>
-              <a:t>26/05/2020</a:t>
+              <a:t>11/07/2020</a:t>
             </a:fld>
             <a:endParaRPr lang="en-AU"/>
           </a:p>
@@ -1833,7 +1833,7 @@
           <a:p>
             <a:fld id="{C2A86601-DD56-4A18-B3D0-977544BEB497}" type="datetimeFigureOut">
               <a:rPr lang="en-AU" smtClean="0"/>
-              <a:t>26/05/2020</a:t>
+              <a:t>11/07/2020</a:t>
             </a:fld>
             <a:endParaRPr lang="en-AU"/>
           </a:p>
@@ -1975,7 +1975,7 @@
           <a:p>
             <a:fld id="{C2A86601-DD56-4A18-B3D0-977544BEB497}" type="datetimeFigureOut">
               <a:rPr lang="en-AU" smtClean="0"/>
-              <a:t>26/05/2020</a:t>
+              <a:t>11/07/2020</a:t>
             </a:fld>
             <a:endParaRPr lang="en-AU"/>
           </a:p>
@@ -2088,7 +2088,7 @@
           <a:p>
             <a:fld id="{C2A86601-DD56-4A18-B3D0-977544BEB497}" type="datetimeFigureOut">
               <a:rPr lang="en-AU" smtClean="0"/>
-              <a:t>26/05/2020</a:t>
+              <a:t>11/07/2020</a:t>
             </a:fld>
             <a:endParaRPr lang="en-AU"/>
           </a:p>
@@ -2401,7 +2401,7 @@
           <a:p>
             <a:fld id="{C2A86601-DD56-4A18-B3D0-977544BEB497}" type="datetimeFigureOut">
               <a:rPr lang="en-AU" smtClean="0"/>
-              <a:t>26/05/2020</a:t>
+              <a:t>11/07/2020</a:t>
             </a:fld>
             <a:endParaRPr lang="en-AU"/>
           </a:p>
@@ -2690,7 +2690,7 @@
           <a:p>
             <a:fld id="{C2A86601-DD56-4A18-B3D0-977544BEB497}" type="datetimeFigureOut">
               <a:rPr lang="en-AU" smtClean="0"/>
-              <a:t>26/05/2020</a:t>
+              <a:t>11/07/2020</a:t>
             </a:fld>
             <a:endParaRPr lang="en-AU"/>
           </a:p>
@@ -2933,7 +2933,7 @@
           <a:p>
             <a:fld id="{C2A86601-DD56-4A18-B3D0-977544BEB497}" type="datetimeFigureOut">
               <a:rPr lang="en-AU" smtClean="0"/>
-              <a:t>26/05/2020</a:t>
+              <a:t>11/07/2020</a:t>
             </a:fld>
             <a:endParaRPr lang="en-AU"/>
           </a:p>
@@ -5465,6 +5465,41 @@
           </a:fontRef>
         </p:style>
       </p:cxnSp>
+      <p:sp>
+        <p:nvSpPr>
+          <p:cNvPr id="62" name="TextBox 61">
+            <a:extLst>
+              <a:ext uri="{FF2B5EF4-FFF2-40B4-BE49-F238E27FC236}">
+                <a16:creationId xmlns:a16="http://schemas.microsoft.com/office/drawing/2014/main" id="{8E808982-4D96-4B5A-998B-9DBE0DB57F8E}"/>
+              </a:ext>
+            </a:extLst>
+          </p:cNvPr>
+          <p:cNvSpPr txBox="1"/>
+          <p:nvPr/>
+        </p:nvSpPr>
+        <p:spPr>
+          <a:xfrm>
+            <a:off x="6994616" y="1480503"/>
+            <a:ext cx="800100" cy="523220"/>
+          </a:xfrm>
+          <a:prstGeom prst="rect">
+            <a:avLst/>
+          </a:prstGeom>
+          <a:noFill/>
+        </p:spPr>
+        <p:txBody>
+          <a:bodyPr wrap="square" rtlCol="0">
+            <a:spAutoFit/>
+          </a:bodyPr>
+          <a:lstStyle/>
+          <a:p>
+            <a:r>
+              <a:rPr lang="en-AU" sz="2800" dirty="0"/>
+              <a:t>B</a:t>
+            </a:r>
+          </a:p>
+        </p:txBody>
+      </p:sp>
     </p:spTree>
     <p:extLst>
       <p:ext uri="{BB962C8B-B14F-4D97-AF65-F5344CB8AC3E}">
@@ -8316,14 +8351,11 @@
           <a:lstStyle/>
           <a:p>
             <a:pPr algn="ctr"/>
-            <a:r>
-              <a:rPr lang="en-AU" dirty="0">
-                <a:solidFill>
-                  <a:schemeClr val="tx1"/>
-                </a:solidFill>
-              </a:rPr>
-              <a:t>C2</a:t>
-            </a:r>
+            <a:endParaRPr lang="en-AU" dirty="0">
+              <a:solidFill>
+                <a:schemeClr val="tx1"/>
+              </a:solidFill>
+            </a:endParaRPr>
           </a:p>
         </p:txBody>
       </p:sp>
@@ -8368,10 +8400,7 @@
           <a:lstStyle/>
           <a:p>
             <a:pPr algn="ctr"/>
-            <a:r>
-              <a:rPr lang="en-AU" dirty="0"/>
-              <a:t>C1</a:t>
-            </a:r>
+            <a:endParaRPr lang="en-AU" dirty="0"/>
           </a:p>
         </p:txBody>
       </p:sp>
@@ -8796,10 +8825,7 @@
           </a:bodyPr>
           <a:lstStyle/>
           <a:p>
-            <a:r>
-              <a:rPr lang="en-AU" sz="2800" dirty="0"/>
-              <a:t>C</a:t>
-            </a:r>
+            <a:endParaRPr lang="en-AU" sz="2800" dirty="0"/>
           </a:p>
         </p:txBody>
       </p:sp>

</xml_diff>